<commit_message>
Update links on final slide
</commit_message>
<xml_diff>
--- a/CanvasData_BirdvilleISD.pptx
+++ b/CanvasData_BirdvilleISD.pptx
@@ -5,7 +5,7 @@
     <p:sldMasterId id="2147483648" r:id="rId1"/>
   </p:sldMasterIdLst>
   <p:notesMasterIdLst>
-    <p:notesMasterId r:id="rId17"/>
+    <p:notesMasterId r:id="rId16"/>
   </p:notesMasterIdLst>
   <p:sldIdLst>
     <p:sldId id="256" r:id="rId2"/>
@@ -20,9 +20,8 @@
     <p:sldId id="261" r:id="rId11"/>
     <p:sldId id="271" r:id="rId12"/>
     <p:sldId id="262" r:id="rId13"/>
-    <p:sldId id="272" r:id="rId14"/>
-    <p:sldId id="264" r:id="rId15"/>
-    <p:sldId id="266" r:id="rId16"/>
+    <p:sldId id="264" r:id="rId14"/>
+    <p:sldId id="266" r:id="rId15"/>
   </p:sldIdLst>
   <p:sldSz cx="12192000" cy="6858000"/>
   <p:notesSz cx="6858000" cy="9144000"/>
@@ -535,7 +534,7 @@
           <a:noFill/>
           <a:extLst>
             <a:ext uri="{909E8E84-426E-40dd-AFC4-6F175D3DCCD1}">
-              <a14:hiddenFill xmlns="" xmlns:a14="http://schemas.microsoft.com/office/drawing/2010/main">
+              <a14:hiddenFill xmlns:a14="http://schemas.microsoft.com/office/drawing/2010/main" xmlns="">
                 <a:solidFill>
                   <a:srgbClr val="FFFFFF"/>
                 </a:solidFill>
@@ -594,7 +593,7 @@
             </a:ln>
             <a:extLst>
               <a:ext uri="{91240B29-F687-4f45-9708-019B960494DF}">
-                <a14:hiddenLine xmlns="" xmlns:a14="http://schemas.microsoft.com/office/drawing/2010/main" w="9525">
+                <a14:hiddenLine xmlns:a14="http://schemas.microsoft.com/office/drawing/2010/main" xmlns="" w="9525">
                   <a:solidFill>
                     <a:srgbClr val="000000"/>
                   </a:solidFill>
@@ -684,7 +683,7 @@
             </a:ln>
             <a:extLst>
               <a:ext uri="{91240B29-F687-4f45-9708-019B960494DF}">
-                <a14:hiddenLine xmlns="" xmlns:a14="http://schemas.microsoft.com/office/drawing/2010/main" w="9525">
+                <a14:hiddenLine xmlns:a14="http://schemas.microsoft.com/office/drawing/2010/main" xmlns="" w="9525">
                   <a:solidFill>
                     <a:srgbClr val="000000"/>
                   </a:solidFill>
@@ -774,7 +773,7 @@
             </a:ln>
             <a:extLst>
               <a:ext uri="{91240B29-F687-4f45-9708-019B960494DF}">
-                <a14:hiddenLine xmlns="" xmlns:a14="http://schemas.microsoft.com/office/drawing/2010/main" w="9525">
+                <a14:hiddenLine xmlns:a14="http://schemas.microsoft.com/office/drawing/2010/main" xmlns="" w="9525">
                   <a:solidFill>
                     <a:srgbClr val="000000"/>
                   </a:solidFill>
@@ -808,7 +807,7 @@
             </a:ln>
             <a:extLst>
               <a:ext uri="{91240B29-F687-4f45-9708-019B960494DF}">
-                <a14:hiddenLine xmlns="" xmlns:a14="http://schemas.microsoft.com/office/drawing/2010/main" w="9525">
+                <a14:hiddenLine xmlns:a14="http://schemas.microsoft.com/office/drawing/2010/main" xmlns="" w="9525">
                   <a:solidFill>
                     <a:srgbClr val="000000"/>
                   </a:solidFill>
@@ -898,7 +897,7 @@
             </a:ln>
             <a:extLst>
               <a:ext uri="{91240B29-F687-4f45-9708-019B960494DF}">
-                <a14:hiddenLine xmlns="" xmlns:a14="http://schemas.microsoft.com/office/drawing/2010/main" w="9525">
+                <a14:hiddenLine xmlns:a14="http://schemas.microsoft.com/office/drawing/2010/main" xmlns="" w="9525">
                   <a:solidFill>
                     <a:srgbClr val="000000"/>
                   </a:solidFill>
@@ -960,7 +959,7 @@
             </a:ln>
             <a:extLst>
               <a:ext uri="{91240B29-F687-4f45-9708-019B960494DF}">
-                <a14:hiddenLine xmlns="" xmlns:a14="http://schemas.microsoft.com/office/drawing/2010/main" w="9525">
+                <a14:hiddenLine xmlns:a14="http://schemas.microsoft.com/office/drawing/2010/main" xmlns="" w="9525">
                   <a:solidFill>
                     <a:srgbClr val="000000"/>
                   </a:solidFill>
@@ -1022,7 +1021,7 @@
             </a:ln>
             <a:extLst>
               <a:ext uri="{91240B29-F687-4f45-9708-019B960494DF}">
-                <a14:hiddenLine xmlns="" xmlns:a14="http://schemas.microsoft.com/office/drawing/2010/main" w="9525">
+                <a14:hiddenLine xmlns:a14="http://schemas.microsoft.com/office/drawing/2010/main" xmlns="" w="9525">
                   <a:solidFill>
                     <a:srgbClr val="000000"/>
                   </a:solidFill>
@@ -1112,7 +1111,7 @@
             </a:ln>
             <a:extLst>
               <a:ext uri="{91240B29-F687-4f45-9708-019B960494DF}">
-                <a14:hiddenLine xmlns="" xmlns:a14="http://schemas.microsoft.com/office/drawing/2010/main" w="9525">
+                <a14:hiddenLine xmlns:a14="http://schemas.microsoft.com/office/drawing/2010/main" xmlns="" w="9525">
                   <a:solidFill>
                     <a:srgbClr val="000000"/>
                   </a:solidFill>
@@ -1174,7 +1173,7 @@
             </a:ln>
             <a:extLst>
               <a:ext uri="{91240B29-F687-4f45-9708-019B960494DF}">
-                <a14:hiddenLine xmlns="" xmlns:a14="http://schemas.microsoft.com/office/drawing/2010/main" w="9525">
+                <a14:hiddenLine xmlns:a14="http://schemas.microsoft.com/office/drawing/2010/main" xmlns="" w="9525">
                   <a:solidFill>
                     <a:srgbClr val="000000"/>
                   </a:solidFill>
@@ -1236,7 +1235,7 @@
             </a:ln>
             <a:extLst>
               <a:ext uri="{91240B29-F687-4f45-9708-019B960494DF}">
-                <a14:hiddenLine xmlns="" xmlns:a14="http://schemas.microsoft.com/office/drawing/2010/main" w="9525">
+                <a14:hiddenLine xmlns:a14="http://schemas.microsoft.com/office/drawing/2010/main" xmlns="" w="9525">
                   <a:solidFill>
                     <a:srgbClr val="000000"/>
                   </a:solidFill>
@@ -1326,7 +1325,7 @@
             </a:ln>
             <a:extLst>
               <a:ext uri="{91240B29-F687-4f45-9708-019B960494DF}">
-                <a14:hiddenLine xmlns="" xmlns:a14="http://schemas.microsoft.com/office/drawing/2010/main" w="9525">
+                <a14:hiddenLine xmlns:a14="http://schemas.microsoft.com/office/drawing/2010/main" xmlns="" w="9525">
                   <a:solidFill>
                     <a:srgbClr val="000000"/>
                   </a:solidFill>
@@ -1416,7 +1415,7 @@
             </a:ln>
             <a:extLst>
               <a:ext uri="{91240B29-F687-4f45-9708-019B960494DF}">
-                <a14:hiddenLine xmlns="" xmlns:a14="http://schemas.microsoft.com/office/drawing/2010/main" w="9525">
+                <a14:hiddenLine xmlns:a14="http://schemas.microsoft.com/office/drawing/2010/main" xmlns="" w="9525">
                   <a:solidFill>
                     <a:srgbClr val="000000"/>
                   </a:solidFill>
@@ -1478,7 +1477,7 @@
             </a:ln>
             <a:extLst>
               <a:ext uri="{91240B29-F687-4f45-9708-019B960494DF}">
-                <a14:hiddenLine xmlns="" xmlns:a14="http://schemas.microsoft.com/office/drawing/2010/main" w="9525">
+                <a14:hiddenLine xmlns:a14="http://schemas.microsoft.com/office/drawing/2010/main" xmlns="" w="9525">
                   <a:solidFill>
                     <a:srgbClr val="000000"/>
                   </a:solidFill>
@@ -1588,7 +1587,7 @@
             </a:ln>
             <a:extLst>
               <a:ext uri="{91240B29-F687-4f45-9708-019B960494DF}">
-                <a14:hiddenLine xmlns="" xmlns:a14="http://schemas.microsoft.com/office/drawing/2010/main" w="9525">
+                <a14:hiddenLine xmlns:a14="http://schemas.microsoft.com/office/drawing/2010/main" xmlns="" w="9525">
                   <a:solidFill>
                     <a:srgbClr val="000000"/>
                   </a:solidFill>
@@ -1650,7 +1649,7 @@
             </a:ln>
             <a:extLst>
               <a:ext uri="{91240B29-F687-4f45-9708-019B960494DF}">
-                <a14:hiddenLine xmlns="" xmlns:a14="http://schemas.microsoft.com/office/drawing/2010/main" w="9525">
+                <a14:hiddenLine xmlns:a14="http://schemas.microsoft.com/office/drawing/2010/main" xmlns="" w="9525">
                   <a:solidFill>
                     <a:srgbClr val="000000"/>
                   </a:solidFill>
@@ -1740,7 +1739,7 @@
             </a:ln>
             <a:extLst>
               <a:ext uri="{91240B29-F687-4f45-9708-019B960494DF}">
-                <a14:hiddenLine xmlns="" xmlns:a14="http://schemas.microsoft.com/office/drawing/2010/main" w="9525">
+                <a14:hiddenLine xmlns:a14="http://schemas.microsoft.com/office/drawing/2010/main" xmlns="" w="9525">
                   <a:solidFill>
                     <a:srgbClr val="000000"/>
                   </a:solidFill>
@@ -1830,7 +1829,7 @@
             </a:ln>
             <a:extLst>
               <a:ext uri="{91240B29-F687-4f45-9708-019B960494DF}">
-                <a14:hiddenLine xmlns="" xmlns:a14="http://schemas.microsoft.com/office/drawing/2010/main" w="9525">
+                <a14:hiddenLine xmlns:a14="http://schemas.microsoft.com/office/drawing/2010/main" xmlns="" w="9525">
                   <a:solidFill>
                     <a:srgbClr val="000000"/>
                   </a:solidFill>
@@ -1892,7 +1891,7 @@
             </a:ln>
             <a:extLst>
               <a:ext uri="{91240B29-F687-4f45-9708-019B960494DF}">
-                <a14:hiddenLine xmlns="" xmlns:a14="http://schemas.microsoft.com/office/drawing/2010/main" w="9525">
+                <a14:hiddenLine xmlns:a14="http://schemas.microsoft.com/office/drawing/2010/main" xmlns="" w="9525">
                   <a:solidFill>
                     <a:srgbClr val="000000"/>
                   </a:solidFill>
@@ -1982,7 +1981,7 @@
             </a:ln>
             <a:extLst>
               <a:ext uri="{91240B29-F687-4f45-9708-019B960494DF}">
-                <a14:hiddenLine xmlns="" xmlns:a14="http://schemas.microsoft.com/office/drawing/2010/main" w="9525">
+                <a14:hiddenLine xmlns:a14="http://schemas.microsoft.com/office/drawing/2010/main" xmlns="" w="9525">
                   <a:solidFill>
                     <a:srgbClr val="000000"/>
                   </a:solidFill>
@@ -2072,7 +2071,7 @@
             </a:ln>
             <a:extLst>
               <a:ext uri="{91240B29-F687-4f45-9708-019B960494DF}">
-                <a14:hiddenLine xmlns="" xmlns:a14="http://schemas.microsoft.com/office/drawing/2010/main" w="9525">
+                <a14:hiddenLine xmlns:a14="http://schemas.microsoft.com/office/drawing/2010/main" xmlns="" w="9525">
                   <a:solidFill>
                     <a:srgbClr val="000000"/>
                   </a:solidFill>
@@ -2128,7 +2127,7 @@
             </a:ln>
             <a:extLst>
               <a:ext uri="{91240B29-F687-4f45-9708-019B960494DF}">
-                <a14:hiddenLine xmlns="" xmlns:a14="http://schemas.microsoft.com/office/drawing/2010/main" w="9525">
+                <a14:hiddenLine xmlns:a14="http://schemas.microsoft.com/office/drawing/2010/main" xmlns="" w="9525">
                   <a:solidFill>
                     <a:srgbClr val="000000"/>
                   </a:solidFill>
@@ -2218,7 +2217,7 @@
             </a:ln>
             <a:extLst>
               <a:ext uri="{91240B29-F687-4f45-9708-019B960494DF}">
-                <a14:hiddenLine xmlns="" xmlns:a14="http://schemas.microsoft.com/office/drawing/2010/main" w="9525">
+                <a14:hiddenLine xmlns:a14="http://schemas.microsoft.com/office/drawing/2010/main" xmlns="" w="9525">
                   <a:solidFill>
                     <a:srgbClr val="000000"/>
                   </a:solidFill>
@@ -2274,7 +2273,7 @@
             </a:ln>
             <a:extLst>
               <a:ext uri="{91240B29-F687-4f45-9708-019B960494DF}">
-                <a14:hiddenLine xmlns="" xmlns:a14="http://schemas.microsoft.com/office/drawing/2010/main" w="9525">
+                <a14:hiddenLine xmlns:a14="http://schemas.microsoft.com/office/drawing/2010/main" xmlns="" w="9525">
                   <a:solidFill>
                     <a:srgbClr val="000000"/>
                   </a:solidFill>
@@ -2364,7 +2363,7 @@
             </a:ln>
             <a:extLst>
               <a:ext uri="{91240B29-F687-4f45-9708-019B960494DF}">
-                <a14:hiddenLine xmlns="" xmlns:a14="http://schemas.microsoft.com/office/drawing/2010/main" w="9525">
+                <a14:hiddenLine xmlns:a14="http://schemas.microsoft.com/office/drawing/2010/main" xmlns="" w="9525">
                   <a:solidFill>
                     <a:srgbClr val="000000"/>
                   </a:solidFill>
@@ -2432,7 +2431,7 @@
             </a:ln>
             <a:extLst>
               <a:ext uri="{91240B29-F687-4f45-9708-019B960494DF}">
-                <a14:hiddenLine xmlns="" xmlns:a14="http://schemas.microsoft.com/office/drawing/2010/main" w="9525">
+                <a14:hiddenLine xmlns:a14="http://schemas.microsoft.com/office/drawing/2010/main" xmlns="" w="9525">
                   <a:solidFill>
                     <a:srgbClr val="000000"/>
                   </a:solidFill>
@@ -2522,7 +2521,7 @@
             </a:ln>
             <a:extLst>
               <a:ext uri="{91240B29-F687-4f45-9708-019B960494DF}">
-                <a14:hiddenLine xmlns="" xmlns:a14="http://schemas.microsoft.com/office/drawing/2010/main" w="9525">
+                <a14:hiddenLine xmlns:a14="http://schemas.microsoft.com/office/drawing/2010/main" xmlns="" w="9525">
                   <a:solidFill>
                     <a:srgbClr val="000000"/>
                   </a:solidFill>
@@ -2590,7 +2589,7 @@
             </a:ln>
             <a:extLst>
               <a:ext uri="{91240B29-F687-4f45-9708-019B960494DF}">
-                <a14:hiddenLine xmlns="" xmlns:a14="http://schemas.microsoft.com/office/drawing/2010/main" w="9525">
+                <a14:hiddenLine xmlns:a14="http://schemas.microsoft.com/office/drawing/2010/main" xmlns="" w="9525">
                   <a:solidFill>
                     <a:srgbClr val="000000"/>
                   </a:solidFill>
@@ -2680,7 +2679,7 @@
             </a:ln>
             <a:extLst>
               <a:ext uri="{91240B29-F687-4f45-9708-019B960494DF}">
-                <a14:hiddenLine xmlns="" xmlns:a14="http://schemas.microsoft.com/office/drawing/2010/main" w="9525">
+                <a14:hiddenLine xmlns:a14="http://schemas.microsoft.com/office/drawing/2010/main" xmlns="" w="9525">
                   <a:solidFill>
                     <a:srgbClr val="000000"/>
                   </a:solidFill>
@@ -2714,7 +2713,7 @@
             </a:ln>
             <a:extLst>
               <a:ext uri="{91240B29-F687-4f45-9708-019B960494DF}">
-                <a14:hiddenLine xmlns="" xmlns:a14="http://schemas.microsoft.com/office/drawing/2010/main" w="9525">
+                <a14:hiddenLine xmlns:a14="http://schemas.microsoft.com/office/drawing/2010/main" xmlns="" w="9525">
                   <a:solidFill>
                     <a:srgbClr val="000000"/>
                   </a:solidFill>
@@ -2804,7 +2803,7 @@
             </a:ln>
             <a:extLst>
               <a:ext uri="{91240B29-F687-4f45-9708-019B960494DF}">
-                <a14:hiddenLine xmlns="" xmlns:a14="http://schemas.microsoft.com/office/drawing/2010/main" w="9525">
+                <a14:hiddenLine xmlns:a14="http://schemas.microsoft.com/office/drawing/2010/main" xmlns="" w="9525">
                   <a:solidFill>
                     <a:srgbClr val="000000"/>
                   </a:solidFill>
@@ -2866,7 +2865,7 @@
             </a:ln>
             <a:extLst>
               <a:ext uri="{91240B29-F687-4f45-9708-019B960494DF}">
-                <a14:hiddenLine xmlns="" xmlns:a14="http://schemas.microsoft.com/office/drawing/2010/main" w="9525">
+                <a14:hiddenLine xmlns:a14="http://schemas.microsoft.com/office/drawing/2010/main" xmlns="" w="9525">
                   <a:solidFill>
                     <a:srgbClr val="000000"/>
                   </a:solidFill>
@@ -2928,7 +2927,7 @@
             </a:ln>
             <a:extLst>
               <a:ext uri="{91240B29-F687-4f45-9708-019B960494DF}">
-                <a14:hiddenLine xmlns="" xmlns:a14="http://schemas.microsoft.com/office/drawing/2010/main" w="9525">
+                <a14:hiddenLine xmlns:a14="http://schemas.microsoft.com/office/drawing/2010/main" xmlns="" w="9525">
                   <a:solidFill>
                     <a:srgbClr val="000000"/>
                   </a:solidFill>
@@ -3018,7 +3017,7 @@
             </a:ln>
             <a:extLst>
               <a:ext uri="{91240B29-F687-4f45-9708-019B960494DF}">
-                <a14:hiddenLine xmlns="" xmlns:a14="http://schemas.microsoft.com/office/drawing/2010/main" w="9525">
+                <a14:hiddenLine xmlns:a14="http://schemas.microsoft.com/office/drawing/2010/main" xmlns="" w="9525">
                   <a:solidFill>
                     <a:srgbClr val="000000"/>
                   </a:solidFill>
@@ -3086,7 +3085,7 @@
             </a:ln>
             <a:extLst>
               <a:ext uri="{91240B29-F687-4f45-9708-019B960494DF}">
-                <a14:hiddenLine xmlns="" xmlns:a14="http://schemas.microsoft.com/office/drawing/2010/main" w="9525">
+                <a14:hiddenLine xmlns:a14="http://schemas.microsoft.com/office/drawing/2010/main" xmlns="" w="9525">
                   <a:solidFill>
                     <a:srgbClr val="000000"/>
                   </a:solidFill>
@@ -3148,7 +3147,7 @@
             </a:ln>
             <a:extLst>
               <a:ext uri="{91240B29-F687-4f45-9708-019B960494DF}">
-                <a14:hiddenLine xmlns="" xmlns:a14="http://schemas.microsoft.com/office/drawing/2010/main" w="9525">
+                <a14:hiddenLine xmlns:a14="http://schemas.microsoft.com/office/drawing/2010/main" xmlns="" w="9525">
                   <a:solidFill>
                     <a:srgbClr val="000000"/>
                   </a:solidFill>
@@ -3238,7 +3237,7 @@
             </a:ln>
             <a:extLst>
               <a:ext uri="{91240B29-F687-4f45-9708-019B960494DF}">
-                <a14:hiddenLine xmlns="" xmlns:a14="http://schemas.microsoft.com/office/drawing/2010/main" w="9525">
+                <a14:hiddenLine xmlns:a14="http://schemas.microsoft.com/office/drawing/2010/main" xmlns="" w="9525">
                   <a:solidFill>
                     <a:srgbClr val="000000"/>
                   </a:solidFill>
@@ -3300,7 +3299,7 @@
             </a:ln>
             <a:extLst>
               <a:ext uri="{91240B29-F687-4f45-9708-019B960494DF}">
-                <a14:hiddenLine xmlns="" xmlns:a14="http://schemas.microsoft.com/office/drawing/2010/main" w="9525">
+                <a14:hiddenLine xmlns:a14="http://schemas.microsoft.com/office/drawing/2010/main" xmlns="" w="9525">
                   <a:solidFill>
                     <a:srgbClr val="000000"/>
                   </a:solidFill>
@@ -3390,7 +3389,7 @@
             </a:ln>
             <a:extLst>
               <a:ext uri="{91240B29-F687-4f45-9708-019B960494DF}">
-                <a14:hiddenLine xmlns="" xmlns:a14="http://schemas.microsoft.com/office/drawing/2010/main" w="9525">
+                <a14:hiddenLine xmlns:a14="http://schemas.microsoft.com/office/drawing/2010/main" xmlns="" w="9525">
                   <a:solidFill>
                     <a:srgbClr val="000000"/>
                   </a:solidFill>
@@ -3452,7 +3451,7 @@
             </a:ln>
             <a:extLst>
               <a:ext uri="{91240B29-F687-4f45-9708-019B960494DF}">
-                <a14:hiddenLine xmlns="" xmlns:a14="http://schemas.microsoft.com/office/drawing/2010/main" w="9525">
+                <a14:hiddenLine xmlns:a14="http://schemas.microsoft.com/office/drawing/2010/main" xmlns="" w="9525">
                   <a:solidFill>
                     <a:srgbClr val="000000"/>
                   </a:solidFill>
@@ -3542,7 +3541,7 @@
             </a:ln>
             <a:extLst>
               <a:ext uri="{91240B29-F687-4f45-9708-019B960494DF}">
-                <a14:hiddenLine xmlns="" xmlns:a14="http://schemas.microsoft.com/office/drawing/2010/main" w="9525">
+                <a14:hiddenLine xmlns:a14="http://schemas.microsoft.com/office/drawing/2010/main" xmlns="" w="9525">
                   <a:solidFill>
                     <a:srgbClr val="000000"/>
                   </a:solidFill>
@@ -3576,7 +3575,7 @@
             </a:ln>
             <a:extLst>
               <a:ext uri="{91240B29-F687-4f45-9708-019B960494DF}">
-                <a14:hiddenLine xmlns="" xmlns:a14="http://schemas.microsoft.com/office/drawing/2010/main" w="9525">
+                <a14:hiddenLine xmlns:a14="http://schemas.microsoft.com/office/drawing/2010/main" xmlns="" w="9525">
                   <a:solidFill>
                     <a:srgbClr val="000000"/>
                   </a:solidFill>
@@ -3641,7 +3640,7 @@
             </a:ln>
             <a:extLst>
               <a:ext uri="{91240B29-F687-4f45-9708-019B960494DF}">
-                <a14:hiddenLine xmlns="" xmlns:a14="http://schemas.microsoft.com/office/drawing/2010/main" w="9525">
+                <a14:hiddenLine xmlns:a14="http://schemas.microsoft.com/office/drawing/2010/main" xmlns="" w="9525">
                   <a:solidFill>
                     <a:srgbClr val="000000"/>
                   </a:solidFill>
@@ -3731,7 +3730,7 @@
             </a:ln>
             <a:extLst>
               <a:ext uri="{91240B29-F687-4f45-9708-019B960494DF}">
-                <a14:hiddenLine xmlns="" xmlns:a14="http://schemas.microsoft.com/office/drawing/2010/main" w="9525">
+                <a14:hiddenLine xmlns:a14="http://schemas.microsoft.com/office/drawing/2010/main" xmlns="" w="9525">
                   <a:solidFill>
                     <a:srgbClr val="000000"/>
                   </a:solidFill>
@@ -3793,7 +3792,7 @@
             </a:ln>
             <a:extLst>
               <a:ext uri="{91240B29-F687-4f45-9708-019B960494DF}">
-                <a14:hiddenLine xmlns="" xmlns:a14="http://schemas.microsoft.com/office/drawing/2010/main" w="9525">
+                <a14:hiddenLine xmlns:a14="http://schemas.microsoft.com/office/drawing/2010/main" xmlns="" w="9525">
                   <a:solidFill>
                     <a:srgbClr val="000000"/>
                   </a:solidFill>
@@ -3883,7 +3882,7 @@
             </a:ln>
             <a:extLst>
               <a:ext uri="{91240B29-F687-4f45-9708-019B960494DF}">
-                <a14:hiddenLine xmlns="" xmlns:a14="http://schemas.microsoft.com/office/drawing/2010/main" w="9525">
+                <a14:hiddenLine xmlns:a14="http://schemas.microsoft.com/office/drawing/2010/main" xmlns="" w="9525">
                   <a:solidFill>
                     <a:srgbClr val="000000"/>
                   </a:solidFill>
@@ -3973,7 +3972,7 @@
             </a:ln>
             <a:extLst>
               <a:ext uri="{91240B29-F687-4f45-9708-019B960494DF}">
-                <a14:hiddenLine xmlns="" xmlns:a14="http://schemas.microsoft.com/office/drawing/2010/main" w="9525">
+                <a14:hiddenLine xmlns:a14="http://schemas.microsoft.com/office/drawing/2010/main" xmlns="" w="9525">
                   <a:solidFill>
                     <a:srgbClr val="000000"/>
                   </a:solidFill>
@@ -4038,7 +4037,7 @@
             </a:ln>
             <a:extLst>
               <a:ext uri="{91240B29-F687-4f45-9708-019B960494DF}">
-                <a14:hiddenLine xmlns="" xmlns:a14="http://schemas.microsoft.com/office/drawing/2010/main" w="9525">
+                <a14:hiddenLine xmlns:a14="http://schemas.microsoft.com/office/drawing/2010/main" xmlns="" w="9525">
                   <a:solidFill>
                     <a:srgbClr val="000000"/>
                   </a:solidFill>
@@ -4100,7 +4099,7 @@
             </a:ln>
             <a:extLst>
               <a:ext uri="{91240B29-F687-4f45-9708-019B960494DF}">
-                <a14:hiddenLine xmlns="" xmlns:a14="http://schemas.microsoft.com/office/drawing/2010/main" w="9525">
+                <a14:hiddenLine xmlns:a14="http://schemas.microsoft.com/office/drawing/2010/main" xmlns="" w="9525">
                   <a:solidFill>
                     <a:srgbClr val="000000"/>
                   </a:solidFill>
@@ -4190,7 +4189,7 @@
             </a:ln>
             <a:extLst>
               <a:ext uri="{91240B29-F687-4f45-9708-019B960494DF}">
-                <a14:hiddenLine xmlns="" xmlns:a14="http://schemas.microsoft.com/office/drawing/2010/main" w="9525">
+                <a14:hiddenLine xmlns:a14="http://schemas.microsoft.com/office/drawing/2010/main" xmlns="" w="9525">
                   <a:solidFill>
                     <a:srgbClr val="000000"/>
                   </a:solidFill>
@@ -4280,7 +4279,7 @@
             </a:ln>
             <a:extLst>
               <a:ext uri="{91240B29-F687-4f45-9708-019B960494DF}">
-                <a14:hiddenLine xmlns="" xmlns:a14="http://schemas.microsoft.com/office/drawing/2010/main" w="9525">
+                <a14:hiddenLine xmlns:a14="http://schemas.microsoft.com/office/drawing/2010/main" xmlns="" w="9525">
                   <a:solidFill>
                     <a:srgbClr val="000000"/>
                   </a:solidFill>
@@ -4342,7 +4341,7 @@
             </a:ln>
             <a:extLst>
               <a:ext uri="{91240B29-F687-4f45-9708-019B960494DF}">
-                <a14:hiddenLine xmlns="" xmlns:a14="http://schemas.microsoft.com/office/drawing/2010/main" w="9525">
+                <a14:hiddenLine xmlns:a14="http://schemas.microsoft.com/office/drawing/2010/main" xmlns="" w="9525">
                   <a:solidFill>
                     <a:srgbClr val="000000"/>
                   </a:solidFill>
@@ -4462,7 +4461,7 @@
             </a:ln>
             <a:extLst>
               <a:ext uri="{91240B29-F687-4f45-9708-019B960494DF}">
-                <a14:hiddenLine xmlns="" xmlns:a14="http://schemas.microsoft.com/office/drawing/2010/main" w="9525">
+                <a14:hiddenLine xmlns:a14="http://schemas.microsoft.com/office/drawing/2010/main" xmlns="" w="9525">
                   <a:solidFill>
                     <a:srgbClr val="000000"/>
                   </a:solidFill>
@@ -4530,7 +4529,7 @@
             </a:ln>
             <a:extLst>
               <a:ext uri="{91240B29-F687-4f45-9708-019B960494DF}">
-                <a14:hiddenLine xmlns="" xmlns:a14="http://schemas.microsoft.com/office/drawing/2010/main" w="9525">
+                <a14:hiddenLine xmlns:a14="http://schemas.microsoft.com/office/drawing/2010/main" xmlns="" w="9525">
                   <a:solidFill>
                     <a:srgbClr val="000000"/>
                   </a:solidFill>
@@ -4620,7 +4619,7 @@
             </a:ln>
             <a:extLst>
               <a:ext uri="{91240B29-F687-4f45-9708-019B960494DF}">
-                <a14:hiddenLine xmlns="" xmlns:a14="http://schemas.microsoft.com/office/drawing/2010/main" w="9525">
+                <a14:hiddenLine xmlns:a14="http://schemas.microsoft.com/office/drawing/2010/main" xmlns="" w="9525">
                   <a:solidFill>
                     <a:srgbClr val="000000"/>
                   </a:solidFill>
@@ -9349,7 +9348,7 @@
           <a:noFill/>
           <a:extLst>
             <a:ext uri="{909E8E84-426E-40dd-AFC4-6F175D3DCCD1}">
-              <a14:hiddenFill xmlns="" xmlns:a14="http://schemas.microsoft.com/office/drawing/2010/main">
+              <a14:hiddenFill xmlns:a14="http://schemas.microsoft.com/office/drawing/2010/main" xmlns="">
                 <a:solidFill>
                   <a:srgbClr val="FFFFFF"/>
                 </a:solidFill>
@@ -9423,7 +9422,7 @@
               </a:ln>
               <a:extLst>
                 <a:ext uri="{91240B29-F687-4f45-9708-019B960494DF}">
-                  <a14:hiddenLine xmlns="" xmlns:a14="http://schemas.microsoft.com/office/drawing/2010/main" w="9525">
+                  <a14:hiddenLine xmlns:a14="http://schemas.microsoft.com/office/drawing/2010/main" xmlns="" w="9525">
                     <a:solidFill>
                       <a:srgbClr val="000000"/>
                     </a:solidFill>
@@ -9513,7 +9512,7 @@
               </a:ln>
               <a:extLst>
                 <a:ext uri="{91240B29-F687-4f45-9708-019B960494DF}">
-                  <a14:hiddenLine xmlns="" xmlns:a14="http://schemas.microsoft.com/office/drawing/2010/main" w="9525">
+                  <a14:hiddenLine xmlns:a14="http://schemas.microsoft.com/office/drawing/2010/main" xmlns="" w="9525">
                     <a:solidFill>
                       <a:srgbClr val="000000"/>
                     </a:solidFill>
@@ -9603,7 +9602,7 @@
               </a:ln>
               <a:extLst>
                 <a:ext uri="{91240B29-F687-4f45-9708-019B960494DF}">
-                  <a14:hiddenLine xmlns="" xmlns:a14="http://schemas.microsoft.com/office/drawing/2010/main" w="9525">
+                  <a14:hiddenLine xmlns:a14="http://schemas.microsoft.com/office/drawing/2010/main" xmlns="" w="9525">
                     <a:solidFill>
                       <a:srgbClr val="000000"/>
                     </a:solidFill>
@@ -9665,7 +9664,7 @@
               </a:ln>
               <a:extLst>
                 <a:ext uri="{91240B29-F687-4f45-9708-019B960494DF}">
-                  <a14:hiddenLine xmlns="" xmlns:a14="http://schemas.microsoft.com/office/drawing/2010/main" w="9525">
+                  <a14:hiddenLine xmlns:a14="http://schemas.microsoft.com/office/drawing/2010/main" xmlns="" w="9525">
                     <a:solidFill>
                       <a:srgbClr val="000000"/>
                     </a:solidFill>
@@ -9755,7 +9754,7 @@
               </a:ln>
               <a:extLst>
                 <a:ext uri="{91240B29-F687-4f45-9708-019B960494DF}">
-                  <a14:hiddenLine xmlns="" xmlns:a14="http://schemas.microsoft.com/office/drawing/2010/main" w="9525">
+                  <a14:hiddenLine xmlns:a14="http://schemas.microsoft.com/office/drawing/2010/main" xmlns="" w="9525">
                     <a:solidFill>
                       <a:srgbClr val="000000"/>
                     </a:solidFill>
@@ -9817,7 +9816,7 @@
               </a:ln>
               <a:extLst>
                 <a:ext uri="{91240B29-F687-4f45-9708-019B960494DF}">
-                  <a14:hiddenLine xmlns="" xmlns:a14="http://schemas.microsoft.com/office/drawing/2010/main" w="9525">
+                  <a14:hiddenLine xmlns:a14="http://schemas.microsoft.com/office/drawing/2010/main" xmlns="" w="9525">
                     <a:solidFill>
                       <a:srgbClr val="000000"/>
                     </a:solidFill>
@@ -9879,7 +9878,7 @@
               </a:ln>
               <a:extLst>
                 <a:ext uri="{91240B29-F687-4f45-9708-019B960494DF}">
-                  <a14:hiddenLine xmlns="" xmlns:a14="http://schemas.microsoft.com/office/drawing/2010/main" w="9525">
+                  <a14:hiddenLine xmlns:a14="http://schemas.microsoft.com/office/drawing/2010/main" xmlns="" w="9525">
                     <a:solidFill>
                       <a:srgbClr val="000000"/>
                     </a:solidFill>
@@ -9969,7 +9968,7 @@
               </a:ln>
               <a:extLst>
                 <a:ext uri="{91240B29-F687-4f45-9708-019B960494DF}">
-                  <a14:hiddenLine xmlns="" xmlns:a14="http://schemas.microsoft.com/office/drawing/2010/main" w="9525">
+                  <a14:hiddenLine xmlns:a14="http://schemas.microsoft.com/office/drawing/2010/main" xmlns="" w="9525">
                     <a:solidFill>
                       <a:srgbClr val="000000"/>
                     </a:solidFill>
@@ -10059,7 +10058,7 @@
               </a:ln>
               <a:extLst>
                 <a:ext uri="{91240B29-F687-4f45-9708-019B960494DF}">
-                  <a14:hiddenLine xmlns="" xmlns:a14="http://schemas.microsoft.com/office/drawing/2010/main" w="9525">
+                  <a14:hiddenLine xmlns:a14="http://schemas.microsoft.com/office/drawing/2010/main" xmlns="" w="9525">
                     <a:solidFill>
                       <a:srgbClr val="000000"/>
                     </a:solidFill>
@@ -10121,7 +10120,7 @@
               </a:ln>
               <a:extLst>
                 <a:ext uri="{91240B29-F687-4f45-9708-019B960494DF}">
-                  <a14:hiddenLine xmlns="" xmlns:a14="http://schemas.microsoft.com/office/drawing/2010/main" w="9525">
+                  <a14:hiddenLine xmlns:a14="http://schemas.microsoft.com/office/drawing/2010/main" xmlns="" w="9525">
                     <a:solidFill>
                       <a:srgbClr val="000000"/>
                     </a:solidFill>
@@ -10231,7 +10230,7 @@
               </a:ln>
               <a:extLst>
                 <a:ext uri="{91240B29-F687-4f45-9708-019B960494DF}">
-                  <a14:hiddenLine xmlns="" xmlns:a14="http://schemas.microsoft.com/office/drawing/2010/main" w="9525">
+                  <a14:hiddenLine xmlns:a14="http://schemas.microsoft.com/office/drawing/2010/main" xmlns="" w="9525">
                     <a:solidFill>
                       <a:srgbClr val="000000"/>
                     </a:solidFill>
@@ -10315,7 +10314,7 @@
               </a:ln>
               <a:extLst>
                 <a:ext uri="{91240B29-F687-4f45-9708-019B960494DF}">
-                  <a14:hiddenLine xmlns="" xmlns:a14="http://schemas.microsoft.com/office/drawing/2010/main" w="9525">
+                  <a14:hiddenLine xmlns:a14="http://schemas.microsoft.com/office/drawing/2010/main" xmlns="" w="9525">
                     <a:solidFill>
                       <a:srgbClr val="000000"/>
                     </a:solidFill>
@@ -10377,7 +10376,7 @@
               </a:ln>
               <a:extLst>
                 <a:ext uri="{91240B29-F687-4f45-9708-019B960494DF}">
-                  <a14:hiddenLine xmlns="" xmlns:a14="http://schemas.microsoft.com/office/drawing/2010/main" w="9525">
+                  <a14:hiddenLine xmlns:a14="http://schemas.microsoft.com/office/drawing/2010/main" xmlns="" w="9525">
                     <a:solidFill>
                       <a:srgbClr val="000000"/>
                     </a:solidFill>
@@ -10439,7 +10438,7 @@
               </a:ln>
               <a:extLst>
                 <a:ext uri="{91240B29-F687-4f45-9708-019B960494DF}">
-                  <a14:hiddenLine xmlns="" xmlns:a14="http://schemas.microsoft.com/office/drawing/2010/main" w="9525">
+                  <a14:hiddenLine xmlns:a14="http://schemas.microsoft.com/office/drawing/2010/main" xmlns="" w="9525">
                     <a:solidFill>
                       <a:srgbClr val="000000"/>
                     </a:solidFill>
@@ -10529,7 +10528,7 @@
               </a:ln>
               <a:extLst>
                 <a:ext uri="{91240B29-F687-4f45-9708-019B960494DF}">
-                  <a14:hiddenLine xmlns="" xmlns:a14="http://schemas.microsoft.com/office/drawing/2010/main" w="9525">
+                  <a14:hiddenLine xmlns:a14="http://schemas.microsoft.com/office/drawing/2010/main" xmlns="" w="9525">
                     <a:solidFill>
                       <a:srgbClr val="000000"/>
                     </a:solidFill>
@@ -10563,7 +10562,7 @@
               </a:ln>
               <a:extLst>
                 <a:ext uri="{91240B29-F687-4f45-9708-019B960494DF}">
-                  <a14:hiddenLine xmlns="" xmlns:a14="http://schemas.microsoft.com/office/drawing/2010/main" w="9525">
+                  <a14:hiddenLine xmlns:a14="http://schemas.microsoft.com/office/drawing/2010/main" xmlns="" w="9525">
                     <a:solidFill>
                       <a:srgbClr val="000000"/>
                     </a:solidFill>
@@ -10628,7 +10627,7 @@
               </a:ln>
               <a:extLst>
                 <a:ext uri="{91240B29-F687-4f45-9708-019B960494DF}">
-                  <a14:hiddenLine xmlns="" xmlns:a14="http://schemas.microsoft.com/office/drawing/2010/main" w="9525">
+                  <a14:hiddenLine xmlns:a14="http://schemas.microsoft.com/office/drawing/2010/main" xmlns="" w="9525">
                     <a:solidFill>
                       <a:srgbClr val="000000"/>
                     </a:solidFill>
@@ -10718,7 +10717,7 @@
               </a:ln>
               <a:extLst>
                 <a:ext uri="{91240B29-F687-4f45-9708-019B960494DF}">
-                  <a14:hiddenLine xmlns="" xmlns:a14="http://schemas.microsoft.com/office/drawing/2010/main" w="9525">
+                  <a14:hiddenLine xmlns:a14="http://schemas.microsoft.com/office/drawing/2010/main" xmlns="" w="9525">
                     <a:solidFill>
                       <a:srgbClr val="000000"/>
                     </a:solidFill>
@@ -10780,7 +10779,7 @@
               </a:ln>
               <a:extLst>
                 <a:ext uri="{91240B29-F687-4f45-9708-019B960494DF}">
-                  <a14:hiddenLine xmlns="" xmlns:a14="http://schemas.microsoft.com/office/drawing/2010/main" w="9525">
+                  <a14:hiddenLine xmlns:a14="http://schemas.microsoft.com/office/drawing/2010/main" xmlns="" w="9525">
                     <a:solidFill>
                       <a:srgbClr val="000000"/>
                     </a:solidFill>
@@ -10870,7 +10869,7 @@
               </a:ln>
               <a:extLst>
                 <a:ext uri="{91240B29-F687-4f45-9708-019B960494DF}">
-                  <a14:hiddenLine xmlns="" xmlns:a14="http://schemas.microsoft.com/office/drawing/2010/main" w="9525">
+                  <a14:hiddenLine xmlns:a14="http://schemas.microsoft.com/office/drawing/2010/main" xmlns="" w="9525">
                     <a:solidFill>
                       <a:srgbClr val="000000"/>
                     </a:solidFill>
@@ -10935,7 +10934,7 @@
               </a:ln>
               <a:extLst>
                 <a:ext uri="{91240B29-F687-4f45-9708-019B960494DF}">
-                  <a14:hiddenLine xmlns="" xmlns:a14="http://schemas.microsoft.com/office/drawing/2010/main" w="9525">
+                  <a14:hiddenLine xmlns:a14="http://schemas.microsoft.com/office/drawing/2010/main" xmlns="" w="9525">
                     <a:solidFill>
                       <a:srgbClr val="000000"/>
                     </a:solidFill>
@@ -10997,7 +10996,7 @@
               </a:ln>
               <a:extLst>
                 <a:ext uri="{91240B29-F687-4f45-9708-019B960494DF}">
-                  <a14:hiddenLine xmlns="" xmlns:a14="http://schemas.microsoft.com/office/drawing/2010/main" w="9525">
+                  <a14:hiddenLine xmlns:a14="http://schemas.microsoft.com/office/drawing/2010/main" xmlns="" w="9525">
                     <a:solidFill>
                       <a:srgbClr val="000000"/>
                     </a:solidFill>
@@ -11087,7 +11086,7 @@
               </a:ln>
               <a:extLst>
                 <a:ext uri="{91240B29-F687-4f45-9708-019B960494DF}">
-                  <a14:hiddenLine xmlns="" xmlns:a14="http://schemas.microsoft.com/office/drawing/2010/main" w="9525">
+                  <a14:hiddenLine xmlns:a14="http://schemas.microsoft.com/office/drawing/2010/main" xmlns="" w="9525">
                     <a:solidFill>
                       <a:srgbClr val="000000"/>
                     </a:solidFill>
@@ -11177,7 +11176,7 @@
               </a:ln>
               <a:extLst>
                 <a:ext uri="{91240B29-F687-4f45-9708-019B960494DF}">
-                  <a14:hiddenLine xmlns="" xmlns:a14="http://schemas.microsoft.com/office/drawing/2010/main" w="9525">
+                  <a14:hiddenLine xmlns:a14="http://schemas.microsoft.com/office/drawing/2010/main" xmlns="" w="9525">
                     <a:solidFill>
                       <a:srgbClr val="000000"/>
                     </a:solidFill>
@@ -11242,7 +11241,7 @@
               </a:ln>
               <a:extLst>
                 <a:ext uri="{91240B29-F687-4f45-9708-019B960494DF}">
-                  <a14:hiddenLine xmlns="" xmlns:a14="http://schemas.microsoft.com/office/drawing/2010/main" w="9525">
+                  <a14:hiddenLine xmlns:a14="http://schemas.microsoft.com/office/drawing/2010/main" xmlns="" w="9525">
                     <a:solidFill>
                       <a:srgbClr val="000000"/>
                     </a:solidFill>
@@ -11362,7 +11361,7 @@
               </a:ln>
               <a:extLst>
                 <a:ext uri="{91240B29-F687-4f45-9708-019B960494DF}">
-                  <a14:hiddenLine xmlns="" xmlns:a14="http://schemas.microsoft.com/office/drawing/2010/main" w="9525">
+                  <a14:hiddenLine xmlns:a14="http://schemas.microsoft.com/office/drawing/2010/main" xmlns="" w="9525">
                     <a:solidFill>
                       <a:srgbClr val="000000"/>
                     </a:solidFill>
@@ -11443,7 +11442,7 @@
               </a:ln>
               <a:extLst>
                 <a:ext uri="{91240B29-F687-4f45-9708-019B960494DF}">
-                  <a14:hiddenLine xmlns="" xmlns:a14="http://schemas.microsoft.com/office/drawing/2010/main" w="9525">
+                  <a14:hiddenLine xmlns:a14="http://schemas.microsoft.com/office/drawing/2010/main" xmlns="" w="9525">
                     <a:solidFill>
                       <a:srgbClr val="000000"/>
                     </a:solidFill>
@@ -11558,7 +11557,7 @@
               </a:ln>
               <a:extLst>
                 <a:ext uri="{91240B29-F687-4f45-9708-019B960494DF}">
-                  <a14:hiddenLine xmlns="" xmlns:a14="http://schemas.microsoft.com/office/drawing/2010/main" w="9525">
+                  <a14:hiddenLine xmlns:a14="http://schemas.microsoft.com/office/drawing/2010/main" xmlns="" w="9525">
                     <a:solidFill>
                       <a:srgbClr val="000000"/>
                     </a:solidFill>
@@ -11648,7 +11647,7 @@
               </a:ln>
               <a:extLst>
                 <a:ext uri="{91240B29-F687-4f45-9708-019B960494DF}">
-                  <a14:hiddenLine xmlns="" xmlns:a14="http://schemas.microsoft.com/office/drawing/2010/main" w="9525">
+                  <a14:hiddenLine xmlns:a14="http://schemas.microsoft.com/office/drawing/2010/main" xmlns="" w="9525">
                     <a:solidFill>
                       <a:srgbClr val="000000"/>
                     </a:solidFill>
@@ -11713,7 +11712,7 @@
               </a:ln>
               <a:extLst>
                 <a:ext uri="{91240B29-F687-4f45-9708-019B960494DF}">
-                  <a14:hiddenLine xmlns="" xmlns:a14="http://schemas.microsoft.com/office/drawing/2010/main" w="9525">
+                  <a14:hiddenLine xmlns:a14="http://schemas.microsoft.com/office/drawing/2010/main" xmlns="" w="9525">
                     <a:solidFill>
                       <a:srgbClr val="000000"/>
                     </a:solidFill>
@@ -11803,7 +11802,7 @@
               </a:ln>
               <a:extLst>
                 <a:ext uri="{91240B29-F687-4f45-9708-019B960494DF}">
-                  <a14:hiddenLine xmlns="" xmlns:a14="http://schemas.microsoft.com/office/drawing/2010/main" w="9525">
+                  <a14:hiddenLine xmlns:a14="http://schemas.microsoft.com/office/drawing/2010/main" xmlns="" w="9525">
                     <a:solidFill>
                       <a:srgbClr val="000000"/>
                     </a:solidFill>
@@ -11871,7 +11870,7 @@
               </a:ln>
               <a:extLst>
                 <a:ext uri="{91240B29-F687-4f45-9708-019B960494DF}">
-                  <a14:hiddenLine xmlns="" xmlns:a14="http://schemas.microsoft.com/office/drawing/2010/main" w="9525">
+                  <a14:hiddenLine xmlns:a14="http://schemas.microsoft.com/office/drawing/2010/main" xmlns="" w="9525">
                     <a:solidFill>
                       <a:srgbClr val="000000"/>
                     </a:solidFill>
@@ -11961,7 +11960,7 @@
               </a:ln>
               <a:extLst>
                 <a:ext uri="{91240B29-F687-4f45-9708-019B960494DF}">
-                  <a14:hiddenLine xmlns="" xmlns:a14="http://schemas.microsoft.com/office/drawing/2010/main" w="9525">
+                  <a14:hiddenLine xmlns:a14="http://schemas.microsoft.com/office/drawing/2010/main" xmlns="" w="9525">
                     <a:solidFill>
                       <a:srgbClr val="000000"/>
                     </a:solidFill>
@@ -12029,7 +12028,7 @@
               </a:ln>
               <a:extLst>
                 <a:ext uri="{91240B29-F687-4f45-9708-019B960494DF}">
-                  <a14:hiddenLine xmlns="" xmlns:a14="http://schemas.microsoft.com/office/drawing/2010/main" w="9525">
+                  <a14:hiddenLine xmlns:a14="http://schemas.microsoft.com/office/drawing/2010/main" xmlns="" w="9525">
                     <a:solidFill>
                       <a:srgbClr val="000000"/>
                     </a:solidFill>
@@ -12119,7 +12118,7 @@
               </a:ln>
               <a:extLst>
                 <a:ext uri="{91240B29-F687-4f45-9708-019B960494DF}">
-                  <a14:hiddenLine xmlns="" xmlns:a14="http://schemas.microsoft.com/office/drawing/2010/main" w="9525">
+                  <a14:hiddenLine xmlns:a14="http://schemas.microsoft.com/office/drawing/2010/main" xmlns="" w="9525">
                     <a:solidFill>
                       <a:srgbClr val="000000"/>
                     </a:solidFill>
@@ -12153,7 +12152,7 @@
               </a:ln>
               <a:extLst>
                 <a:ext uri="{91240B29-F687-4f45-9708-019B960494DF}">
-                  <a14:hiddenLine xmlns="" xmlns:a14="http://schemas.microsoft.com/office/drawing/2010/main" w="9525">
+                  <a14:hiddenLine xmlns:a14="http://schemas.microsoft.com/office/drawing/2010/main" xmlns="" w="9525">
                     <a:solidFill>
                       <a:srgbClr val="000000"/>
                     </a:solidFill>
@@ -12973,16 +12972,18 @@
         <p:spPr>
           <a:xfrm>
             <a:off x="1146705" y="609601"/>
-            <a:ext cx="3973935" cy="878378"/>
+            <a:ext cx="4355108" cy="878378"/>
           </a:xfrm>
         </p:spPr>
         <p:txBody>
-          <a:bodyPr/>
+          <a:bodyPr>
+            <a:normAutofit/>
+          </a:bodyPr>
           <a:lstStyle/>
           <a:p>
             <a:r>
               <a:rPr lang="en-US" dirty="0"/>
-              <a:t>What’s it look like?</a:t>
+              <a:t>How does it work?</a:t>
             </a:r>
           </a:p>
         </p:txBody>
@@ -13284,114 +13285,6 @@
             <p:ph type="title"/>
           </p:nvPr>
         </p:nvSpPr>
-        <p:spPr/>
-        <p:txBody>
-          <a:bodyPr/>
-          <a:lstStyle/>
-          <a:p>
-            <a:r>
-              <a:rPr lang="en-US" dirty="0" smtClean="0"/>
-              <a:t>Exporting </a:t>
-            </a:r>
-            <a:r>
-              <a:rPr lang="en-US" dirty="0" err="1" smtClean="0"/>
-              <a:t>api</a:t>
-            </a:r>
-            <a:r>
-              <a:rPr lang="en-US" dirty="0" smtClean="0"/>
-              <a:t> information into excel</a:t>
-            </a:r>
-            <a:endParaRPr lang="en-US" dirty="0"/>
-          </a:p>
-        </p:txBody>
-      </p:sp>
-      <p:sp>
-        <p:nvSpPr>
-          <p:cNvPr id="4" name="Text Placeholder 3"/>
-          <p:cNvSpPr>
-            <a:spLocks noGrp="1"/>
-          </p:cNvSpPr>
-          <p:nvPr>
-            <p:ph type="body" sz="half" idx="2"/>
-          </p:nvPr>
-        </p:nvSpPr>
-        <p:spPr/>
-        <p:txBody>
-          <a:bodyPr/>
-          <a:lstStyle/>
-          <a:p>
-            <a:r>
-              <a:rPr lang="en-US" dirty="0" smtClean="0"/>
-              <a:t>With only a few lines of code, it is easy to send GET calls into a spreadsheet.</a:t>
-            </a:r>
-            <a:endParaRPr lang="en-US" dirty="0"/>
-          </a:p>
-        </p:txBody>
-      </p:sp>
-      <p:pic>
-        <p:nvPicPr>
-          <p:cNvPr id="7" name="Picture 6"/>
-          <p:cNvPicPr>
-            <a:picLocks noChangeAspect="1"/>
-          </p:cNvPicPr>
-          <p:nvPr/>
-        </p:nvPicPr>
-        <p:blipFill>
-          <a:blip r:embed="rId2"/>
-          <a:stretch>
-            <a:fillRect/>
-          </a:stretch>
-        </p:blipFill>
-        <p:spPr>
-          <a:xfrm>
-            <a:off x="1141364" y="357448"/>
-            <a:ext cx="9910859" cy="3761116"/>
-          </a:xfrm>
-          <a:prstGeom prst="rect">
-            <a:avLst/>
-          </a:prstGeom>
-        </p:spPr>
-      </p:pic>
-    </p:spTree>
-    <p:extLst>
-      <p:ext uri="{BB962C8B-B14F-4D97-AF65-F5344CB8AC3E}">
-        <p14:creationId xmlns:p14="http://schemas.microsoft.com/office/powerpoint/2010/main" val="2876141446"/>
-      </p:ext>
-    </p:extLst>
-  </p:cSld>
-  <p:clrMapOvr>
-    <a:masterClrMapping/>
-  </p:clrMapOvr>
-</p:sld>
-</file>
-
-<file path=ppt/slides/slide14.xml><?xml version="1.0" encoding="utf-8"?>
-<p:sld xmlns:a="http://schemas.openxmlformats.org/drawingml/2006/main" xmlns:r="http://schemas.openxmlformats.org/officeDocument/2006/relationships" xmlns:p="http://schemas.openxmlformats.org/presentationml/2006/main">
-  <p:cSld>
-    <p:spTree>
-      <p:nvGrpSpPr>
-        <p:cNvPr id="1" name=""/>
-        <p:cNvGrpSpPr/>
-        <p:nvPr/>
-      </p:nvGrpSpPr>
-      <p:grpSpPr>
-        <a:xfrm>
-          <a:off x="0" y="0"/>
-          <a:ext cx="0" cy="0"/>
-          <a:chOff x="0" y="0"/>
-          <a:chExt cx="0" cy="0"/>
-        </a:xfrm>
-      </p:grpSpPr>
-      <p:sp>
-        <p:nvSpPr>
-          <p:cNvPr id="2" name="Title 1"/>
-          <p:cNvSpPr>
-            <a:spLocks noGrp="1"/>
-          </p:cNvSpPr>
-          <p:nvPr>
-            <p:ph type="title"/>
-          </p:nvPr>
-        </p:nvSpPr>
         <p:spPr>
           <a:xfrm>
             <a:off x="4013312" y="438883"/>
@@ -13483,7 +13376,7 @@
 </p:sld>
 </file>
 
-<file path=ppt/slides/slide15.xml><?xml version="1.0" encoding="utf-8"?>
+<file path=ppt/slides/slide14.xml><?xml version="1.0" encoding="utf-8"?>
 <p:sld xmlns:a="http://schemas.openxmlformats.org/drawingml/2006/main" xmlns:r="http://schemas.openxmlformats.org/officeDocument/2006/relationships" xmlns:p="http://schemas.openxmlformats.org/presentationml/2006/main">
   <p:cSld>
     <p:spTree>
@@ -13512,8 +13405,8 @@
         </p:nvSpPr>
         <p:spPr>
           <a:xfrm>
-            <a:off x="1141413" y="668394"/>
-            <a:ext cx="9905998" cy="844522"/>
+            <a:off x="3172690" y="324446"/>
+            <a:ext cx="5846617" cy="844522"/>
           </a:xfrm>
         </p:spPr>
         <p:txBody>
@@ -13539,13 +13432,13 @@
         </p:nvSpPr>
         <p:spPr>
           <a:xfrm>
-            <a:off x="1141412" y="1512916"/>
+            <a:off x="1143000" y="1177357"/>
             <a:ext cx="9905999" cy="5153891"/>
           </a:xfrm>
         </p:spPr>
         <p:txBody>
           <a:bodyPr>
-            <a:normAutofit/>
+            <a:normAutofit lnSpcReduction="10000"/>
           </a:bodyPr>
           <a:lstStyle/>
           <a:p>
@@ -13581,15 +13474,20 @@
             <a:endParaRPr lang="en-US" dirty="0"/>
           </a:p>
           <a:p>
+            <a:pPr lvl="1"/>
+            <a:r>
+              <a:rPr lang="en-US" dirty="0" err="1"/>
+              <a:t>Github</a:t>
+            </a:r>
             <a:r>
               <a:rPr lang="en-US" dirty="0"/>
-              <a:t>Canvas Data Portal Documentation: </a:t>
+              <a:t>: </a:t>
             </a:r>
             <a:r>
               <a:rPr lang="en-US" dirty="0">
                 <a:hlinkClick r:id="rId3"/>
               </a:rPr>
-              <a:t>https://portal.inshosteddata.com/docs</a:t>
+              <a:t>https://github.com/robertwleonard/CanvasData</a:t>
             </a:r>
             <a:r>
               <a:rPr lang="en-US" dirty="0"/>
@@ -13599,13 +13497,13 @@
           <a:p>
             <a:r>
               <a:rPr lang="en-US" dirty="0"/>
-              <a:t>Canvas API Documentation: </a:t>
+              <a:t>Canvas Data Portal Documentation: </a:t>
             </a:r>
             <a:r>
               <a:rPr lang="en-US" dirty="0">
                 <a:hlinkClick r:id="rId4"/>
               </a:rPr>
-              <a:t>https://canvas.instructure.com/doc/api/</a:t>
+              <a:t>https://portal.inshosteddata.com/docs</a:t>
             </a:r>
             <a:r>
               <a:rPr lang="en-US" dirty="0"/>
@@ -13615,57 +13513,50 @@
           <a:p>
             <a:r>
               <a:rPr lang="en-US" dirty="0"/>
-              <a:t>Canvas Data Community: </a:t>
+              <a:t>Canvas API Documentation: </a:t>
             </a:r>
             <a:r>
               <a:rPr lang="en-US" dirty="0">
                 <a:hlinkClick r:id="rId5"/>
               </a:rPr>
-              <a:t>https://</a:t>
-            </a:r>
-            <a:r>
-              <a:rPr lang="en-US" dirty="0" smtClean="0">
-                <a:hlinkClick r:id="rId5"/>
-              </a:rPr>
-              <a:t>community.canvaslms.com/community/answers/data</a:t>
-            </a:r>
-            <a:endParaRPr lang="en-US" dirty="0" smtClean="0"/>
-          </a:p>
-          <a:p>
-            <a:endParaRPr lang="en-US" dirty="0"/>
-          </a:p>
-          <a:p>
+              <a:t>https://canvas.instructure.com/doc/api/</a:t>
+            </a:r>
             <a:r>
               <a:rPr lang="en-US" dirty="0"/>
-              <a:t>Setting Up the Data </a:t>
-            </a:r>
-            <a:r>
-              <a:rPr lang="en-US" dirty="0" smtClean="0"/>
-              <a:t>CLI: </a:t>
-            </a:r>
-            <a:r>
-              <a:rPr lang="en-US" dirty="0" smtClean="0">
-                <a:hlinkClick r:id="rId6"/>
-              </a:rPr>
-              <a:t>https</a:t>
+              <a:t> </a:t>
+            </a:r>
+          </a:p>
+          <a:p>
+            <a:r>
+              <a:rPr lang="en-US" dirty="0"/>
+              <a:t>Canvas Data Community: </a:t>
             </a:r>
             <a:r>
               <a:rPr lang="en-US" dirty="0">
                 <a:hlinkClick r:id="rId6"/>
               </a:rPr>
-              <a:t>://</a:t>
-            </a:r>
-            <a:r>
-              <a:rPr lang="en-US" dirty="0" smtClean="0">
-                <a:hlinkClick r:id="rId6"/>
+              <a:t>https://community.canvaslms.com/community/answers/data</a:t>
+            </a:r>
+            <a:endParaRPr lang="en-US" dirty="0"/>
+          </a:p>
+          <a:p>
+            <a:endParaRPr lang="en-US" dirty="0"/>
+          </a:p>
+          <a:p>
+            <a:r>
+              <a:rPr lang="en-US" dirty="0"/>
+              <a:t>Setting Up the Data CLI: </a:t>
+            </a:r>
+            <a:r>
+              <a:rPr lang="en-US" dirty="0">
+                <a:hlinkClick r:id="rId7"/>
               </a:rPr>
-              <a:t>community.canvaslms.com/docs/DOC-6600-how-to-use-the-canvas-data-cli-tool</a:t>
-            </a:r>
-            <a:r>
-              <a:rPr lang="en-US" dirty="0" smtClean="0"/>
+              <a:t>https://community.canvaslms.com/docs/DOC-6600-how-to-use-the-canvas-data-cli-tool</a:t>
+            </a:r>
+            <a:r>
+              <a:rPr lang="en-US" dirty="0"/>
               <a:t> </a:t>
             </a:r>
-            <a:endParaRPr lang="en-US" dirty="0"/>
           </a:p>
         </p:txBody>
       </p:sp>
@@ -13740,8 +13631,8 @@
         </p:nvSpPr>
         <p:spPr>
           <a:xfrm>
-            <a:off x="847447" y="1105593"/>
-            <a:ext cx="3856037" cy="3541714"/>
+            <a:off x="847447" y="1105592"/>
+            <a:ext cx="3856037" cy="4832497"/>
           </a:xfrm>
         </p:spPr>
         <p:txBody>
@@ -13752,6 +13643,15 @@
               <a:rPr lang="en-US" dirty="0"/>
               <a:t>There is no question that Canvas provides users with an overwhelming amount of data. It’s not whether or not this information is useful, but how we use it.</a:t>
             </a:r>
+          </a:p>
+          <a:p>
+            <a:endParaRPr lang="en-US" dirty="0"/>
+          </a:p>
+          <a:p>
+            <a:endParaRPr lang="en-US" dirty="0"/>
+          </a:p>
+          <a:p>
+            <a:endParaRPr lang="en-US" dirty="0"/>
           </a:p>
           <a:p>
             <a:endParaRPr lang="en-US" dirty="0"/>
@@ -14016,7 +13916,7 @@
         </p:nvSpPr>
         <p:spPr>
           <a:xfrm>
-            <a:off x="3472541" y="1102943"/>
+            <a:off x="3631174" y="238877"/>
             <a:ext cx="4777251" cy="927041"/>
           </a:xfrm>
         </p:spPr>
@@ -14137,6 +14037,55 @@
           </a:prstGeom>
         </p:spPr>
       </p:pic>
+      <p:sp>
+        <p:nvSpPr>
+          <p:cNvPr id="4" name="TextBox 3">
+            <a:extLst>
+              <a:ext uri="{FF2B5EF4-FFF2-40B4-BE49-F238E27FC236}">
+                <a16:creationId xmlns:a16="http://schemas.microsoft.com/office/drawing/2014/main" id="{7DC67543-FD7A-4636-8131-6DD9D9C34E38}"/>
+              </a:ext>
+            </a:extLst>
+          </p:cNvPr>
+          <p:cNvSpPr txBox="1"/>
+          <p:nvPr/>
+        </p:nvSpPr>
+        <p:spPr>
+          <a:xfrm>
+            <a:off x="3394044" y="1464626"/>
+            <a:ext cx="5251509" cy="646331"/>
+          </a:xfrm>
+          <a:prstGeom prst="rect">
+            <a:avLst/>
+          </a:prstGeom>
+          <a:noFill/>
+        </p:spPr>
+        <p:txBody>
+          <a:bodyPr wrap="square" rtlCol="0">
+            <a:spAutoFit/>
+          </a:bodyPr>
+          <a:lstStyle/>
+          <a:p>
+            <a:r>
+              <a:rPr lang="en-US" dirty="0" err="1"/>
+              <a:t>assignment_fact.assignment_id</a:t>
+            </a:r>
+            <a:r>
+              <a:rPr lang="en-US" dirty="0"/>
+              <a:t> == assignment_dim.id</a:t>
+            </a:r>
+          </a:p>
+          <a:p>
+            <a:r>
+              <a:rPr lang="en-US" dirty="0" err="1"/>
+              <a:t>assignment_fact.course_id</a:t>
+            </a:r>
+            <a:r>
+              <a:rPr lang="en-US" dirty="0"/>
+              <a:t> == course_dim.id</a:t>
+            </a:r>
+          </a:p>
+        </p:txBody>
+      </p:sp>
     </p:spTree>
     <p:extLst>
       <p:ext uri="{BB962C8B-B14F-4D97-AF65-F5344CB8AC3E}">
@@ -14179,8 +14128,8 @@
         </p:nvSpPr>
         <p:spPr>
           <a:xfrm>
-            <a:off x="1141413" y="497030"/>
-            <a:ext cx="4336674" cy="1143780"/>
+            <a:off x="1307450" y="149233"/>
+            <a:ext cx="4336674" cy="718021"/>
           </a:xfrm>
         </p:spPr>
         <p:txBody>
@@ -14212,7 +14161,7 @@
         </p:blipFill>
         <p:spPr>
           <a:xfrm>
-            <a:off x="1141413" y="1637434"/>
+            <a:off x="1007189" y="1058239"/>
             <a:ext cx="4790725" cy="2660246"/>
           </a:xfrm>
           <a:prstGeom prst="rect">
@@ -14283,7 +14232,7 @@
         </p:blipFill>
         <p:spPr>
           <a:xfrm>
-            <a:off x="1307450" y="4469638"/>
+            <a:off x="1309038" y="4301858"/>
             <a:ext cx="9573924" cy="2239129"/>
           </a:xfrm>
           <a:prstGeom prst="rect">
@@ -14511,7 +14460,7 @@
           <a:p>
             <a:r>
               <a:rPr lang="en-US" dirty="0"/>
-              <a:t>What the heck is an API??</a:t>
+              <a:t>What the heck is an API!?</a:t>
             </a:r>
           </a:p>
         </p:txBody>
@@ -14528,8 +14477,8 @@
         </p:nvSpPr>
         <p:spPr>
           <a:xfrm>
-            <a:off x="739833" y="883560"/>
-            <a:ext cx="6030953" cy="5675949"/>
+            <a:off x="739833" y="645952"/>
+            <a:ext cx="6030953" cy="5913558"/>
           </a:xfrm>
         </p:spPr>
         <p:txBody>
@@ -14539,7 +14488,7 @@
           <a:lstStyle/>
           <a:p>
             <a:r>
-              <a:rPr lang="en-US" b="1" dirty="0"/>
+              <a:rPr lang="en-US" sz="2200" b="1" dirty="0"/>
               <a:t>Application Programming Interface</a:t>
             </a:r>
           </a:p>

</xml_diff>